<commit_message>
System overview ppt with bluetooth comm
</commit_message>
<xml_diff>
--- a/system_overview/SystemOverview.pptx
+++ b/system_overview/SystemOverview.pptx
@@ -107,6 +107,11 @@
       </a:defRPr>
     </a:lvl9pPr>
   </p:defaultTextStyle>
+  <p:extLst>
+    <p:ext uri="{EFAFB233-063F-42B5-8137-9DF3F51BA10A}">
+      <p15:sldGuideLst xmlns:p15="http://schemas.microsoft.com/office/powerpoint/2012/main"/>
+    </p:ext>
+  </p:extLst>
 </p:presentation>
 </file>
 
@@ -675,7 +680,7 @@
           <a:p>
             <a:fld id="{53227B52-D19E-494A-ACCE-1D7F88203449}" type="datetimeFigureOut">
               <a:rPr lang="en-GB" smtClean="0"/>
-              <a:t>15/11/2020</a:t>
+              <a:t>18/11/2020</a:t>
             </a:fld>
             <a:endParaRPr lang="en-GB"/>
           </a:p>
@@ -845,7 +850,7 @@
           <a:p>
             <a:fld id="{53227B52-D19E-494A-ACCE-1D7F88203449}" type="datetimeFigureOut">
               <a:rPr lang="en-GB" smtClean="0"/>
-              <a:t>15/11/2020</a:t>
+              <a:t>18/11/2020</a:t>
             </a:fld>
             <a:endParaRPr lang="en-GB"/>
           </a:p>
@@ -1025,7 +1030,7 @@
           <a:p>
             <a:fld id="{53227B52-D19E-494A-ACCE-1D7F88203449}" type="datetimeFigureOut">
               <a:rPr lang="en-GB" smtClean="0"/>
-              <a:t>15/11/2020</a:t>
+              <a:t>18/11/2020</a:t>
             </a:fld>
             <a:endParaRPr lang="en-GB"/>
           </a:p>
@@ -1195,7 +1200,7 @@
           <a:p>
             <a:fld id="{53227B52-D19E-494A-ACCE-1D7F88203449}" type="datetimeFigureOut">
               <a:rPr lang="en-GB" smtClean="0"/>
-              <a:t>15/11/2020</a:t>
+              <a:t>18/11/2020</a:t>
             </a:fld>
             <a:endParaRPr lang="en-GB"/>
           </a:p>
@@ -1439,7 +1444,7 @@
           <a:p>
             <a:fld id="{53227B52-D19E-494A-ACCE-1D7F88203449}" type="datetimeFigureOut">
               <a:rPr lang="en-GB" smtClean="0"/>
-              <a:t>15/11/2020</a:t>
+              <a:t>18/11/2020</a:t>
             </a:fld>
             <a:endParaRPr lang="en-GB"/>
           </a:p>
@@ -1671,7 +1676,7 @@
           <a:p>
             <a:fld id="{53227B52-D19E-494A-ACCE-1D7F88203449}" type="datetimeFigureOut">
               <a:rPr lang="en-GB" smtClean="0"/>
-              <a:t>15/11/2020</a:t>
+              <a:t>18/11/2020</a:t>
             </a:fld>
             <a:endParaRPr lang="en-GB"/>
           </a:p>
@@ -2038,7 +2043,7 @@
           <a:p>
             <a:fld id="{53227B52-D19E-494A-ACCE-1D7F88203449}" type="datetimeFigureOut">
               <a:rPr lang="en-GB" smtClean="0"/>
-              <a:t>15/11/2020</a:t>
+              <a:t>18/11/2020</a:t>
             </a:fld>
             <a:endParaRPr lang="en-GB"/>
           </a:p>
@@ -2156,7 +2161,7 @@
           <a:p>
             <a:fld id="{53227B52-D19E-494A-ACCE-1D7F88203449}" type="datetimeFigureOut">
               <a:rPr lang="en-GB" smtClean="0"/>
-              <a:t>15/11/2020</a:t>
+              <a:t>18/11/2020</a:t>
             </a:fld>
             <a:endParaRPr lang="en-GB"/>
           </a:p>
@@ -2251,7 +2256,7 @@
           <a:p>
             <a:fld id="{53227B52-D19E-494A-ACCE-1D7F88203449}" type="datetimeFigureOut">
               <a:rPr lang="en-GB" smtClean="0"/>
-              <a:t>15/11/2020</a:t>
+              <a:t>18/11/2020</a:t>
             </a:fld>
             <a:endParaRPr lang="en-GB"/>
           </a:p>
@@ -2528,7 +2533,7 @@
           <a:p>
             <a:fld id="{53227B52-D19E-494A-ACCE-1D7F88203449}" type="datetimeFigureOut">
               <a:rPr lang="en-GB" smtClean="0"/>
-              <a:t>15/11/2020</a:t>
+              <a:t>18/11/2020</a:t>
             </a:fld>
             <a:endParaRPr lang="en-GB"/>
           </a:p>
@@ -2785,7 +2790,7 @@
           <a:p>
             <a:fld id="{53227B52-D19E-494A-ACCE-1D7F88203449}" type="datetimeFigureOut">
               <a:rPr lang="en-GB" smtClean="0"/>
-              <a:t>15/11/2020</a:t>
+              <a:t>18/11/2020</a:t>
             </a:fld>
             <a:endParaRPr lang="en-GB"/>
           </a:p>
@@ -2998,7 +3003,7 @@
           <a:p>
             <a:fld id="{53227B52-D19E-494A-ACCE-1D7F88203449}" type="datetimeFigureOut">
               <a:rPr lang="en-GB" smtClean="0"/>
-              <a:t>15/11/2020</a:t>
+              <a:t>18/11/2020</a:t>
             </a:fld>
             <a:endParaRPr lang="en-GB"/>
           </a:p>
@@ -4704,7 +4709,7 @@
         </p:nvSpPr>
         <p:spPr>
           <a:xfrm>
-            <a:off x="2390823" y="14308574"/>
+            <a:off x="2390823" y="14293334"/>
             <a:ext cx="2648633" cy="2386593"/>
           </a:xfrm>
           <a:prstGeom prst="rect">
@@ -4773,7 +4778,7 @@
         </p:nvSpPr>
         <p:spPr>
           <a:xfrm>
-            <a:off x="2768989" y="14937064"/>
+            <a:off x="2768989" y="14921824"/>
             <a:ext cx="1892300" cy="1378856"/>
           </a:xfrm>
           <a:prstGeom prst="rect">
@@ -4922,8 +4927,8 @@
         </p:nvSpPr>
         <p:spPr>
           <a:xfrm>
-            <a:off x="13651092" y="14939371"/>
-            <a:ext cx="1892300" cy="1755796"/>
+            <a:off x="13651092" y="14521843"/>
+            <a:ext cx="1892300" cy="2173324"/>
           </a:xfrm>
           <a:prstGeom prst="rect">
             <a:avLst/>
@@ -4959,7 +4964,7 @@
           <a:p>
             <a:pPr algn="ctr"/>
             <a:r>
-              <a:rPr lang="en-GB" sz="2500" dirty="0" err="1">
+              <a:rPr lang="en-GB" sz="2500" dirty="0">
                 <a:ln w="0"/>
                 <a:solidFill>
                   <a:schemeClr val="tx1"/>
@@ -4972,21 +4977,8 @@
                   </a:outerShdw>
                 </a:effectLst>
               </a:rPr>
-              <a:t>Wifi</a:t>
-            </a:r>
-            <a:endParaRPr lang="en-GB" sz="2500" dirty="0">
-              <a:ln w="0"/>
-              <a:solidFill>
-                <a:schemeClr val="tx1"/>
-              </a:solidFill>
-              <a:effectLst>
-                <a:outerShdw blurRad="38100" dist="19050" dir="2700000" algn="tl" rotWithShape="0">
-                  <a:schemeClr val="dk1">
-                    <a:alpha val="40000"/>
-                  </a:schemeClr>
-                </a:outerShdw>
-              </a:effectLst>
-            </a:endParaRPr>
+              <a:t>Bluetooth</a:t>
+            </a:r>
           </a:p>
           <a:p>
             <a:pPr algn="ctr"/>
@@ -5009,182 +5001,6 @@
           </a:p>
         </p:txBody>
       </p:sp>
-      <p:cxnSp>
-        <p:nvCxnSpPr>
-          <p:cNvPr id="100" name="Straight Arrow Connector 99">
-            <a:extLst>
-              <a:ext uri="{FF2B5EF4-FFF2-40B4-BE49-F238E27FC236}">
-                <a16:creationId xmlns:a16="http://schemas.microsoft.com/office/drawing/2014/main" id="{FE02AF19-A674-415B-8808-94F799D628B3}"/>
-              </a:ext>
-            </a:extLst>
-          </p:cNvPr>
-          <p:cNvCxnSpPr>
-            <a:cxnSpLocks/>
-          </p:cNvCxnSpPr>
-          <p:nvPr/>
-        </p:nvCxnSpPr>
-        <p:spPr>
-          <a:xfrm flipH="1">
-            <a:off x="11837628" y="16000244"/>
-            <a:ext cx="1813464" cy="8637"/>
-          </a:xfrm>
-          <a:prstGeom prst="straightConnector1">
-            <a:avLst/>
-          </a:prstGeom>
-          <a:ln w="76200">
-            <a:solidFill>
-              <a:schemeClr val="tx1"/>
-            </a:solidFill>
-            <a:tailEnd type="triangle"/>
-          </a:ln>
-        </p:spPr>
-        <p:style>
-          <a:lnRef idx="1">
-            <a:schemeClr val="accent1"/>
-          </a:lnRef>
-          <a:fillRef idx="0">
-            <a:schemeClr val="accent1"/>
-          </a:fillRef>
-          <a:effectRef idx="0">
-            <a:schemeClr val="accent1"/>
-          </a:effectRef>
-          <a:fontRef idx="minor">
-            <a:schemeClr val="tx1"/>
-          </a:fontRef>
-        </p:style>
-      </p:cxnSp>
-      <p:cxnSp>
-        <p:nvCxnSpPr>
-          <p:cNvPr id="103" name="Straight Arrow Connector 102">
-            <a:extLst>
-              <a:ext uri="{FF2B5EF4-FFF2-40B4-BE49-F238E27FC236}">
-                <a16:creationId xmlns:a16="http://schemas.microsoft.com/office/drawing/2014/main" id="{D65F41BB-188A-4212-9F5B-96FFCA3D200A}"/>
-              </a:ext>
-            </a:extLst>
-          </p:cNvPr>
-          <p:cNvCxnSpPr>
-            <a:cxnSpLocks/>
-          </p:cNvCxnSpPr>
-          <p:nvPr/>
-        </p:nvCxnSpPr>
-        <p:spPr>
-          <a:xfrm>
-            <a:off x="11855644" y="15439940"/>
-            <a:ext cx="1795448" cy="0"/>
-          </a:xfrm>
-          <a:prstGeom prst="straightConnector1">
-            <a:avLst/>
-          </a:prstGeom>
-          <a:ln w="76200">
-            <a:solidFill>
-              <a:schemeClr val="tx1"/>
-            </a:solidFill>
-            <a:tailEnd type="triangle"/>
-          </a:ln>
-        </p:spPr>
-        <p:style>
-          <a:lnRef idx="1">
-            <a:schemeClr val="accent1"/>
-          </a:lnRef>
-          <a:fillRef idx="0">
-            <a:schemeClr val="accent1"/>
-          </a:fillRef>
-          <a:effectRef idx="0">
-            <a:schemeClr val="accent1"/>
-          </a:effectRef>
-          <a:fontRef idx="minor">
-            <a:schemeClr val="tx1"/>
-          </a:fontRef>
-        </p:style>
-      </p:cxnSp>
-      <p:cxnSp>
-        <p:nvCxnSpPr>
-          <p:cNvPr id="127" name="Straight Arrow Connector 126">
-            <a:extLst>
-              <a:ext uri="{FF2B5EF4-FFF2-40B4-BE49-F238E27FC236}">
-                <a16:creationId xmlns:a16="http://schemas.microsoft.com/office/drawing/2014/main" id="{180735A6-F10D-4FAE-BB64-64334452BE85}"/>
-              </a:ext>
-            </a:extLst>
-          </p:cNvPr>
-          <p:cNvCxnSpPr>
-            <a:cxnSpLocks/>
-          </p:cNvCxnSpPr>
-          <p:nvPr/>
-        </p:nvCxnSpPr>
-        <p:spPr>
-          <a:xfrm flipH="1">
-            <a:off x="4667961" y="15838905"/>
-            <a:ext cx="1736820" cy="0"/>
-          </a:xfrm>
-          <a:prstGeom prst="straightConnector1">
-            <a:avLst/>
-          </a:prstGeom>
-          <a:ln w="76200">
-            <a:solidFill>
-              <a:schemeClr val="tx1"/>
-            </a:solidFill>
-            <a:tailEnd type="triangle"/>
-          </a:ln>
-        </p:spPr>
-        <p:style>
-          <a:lnRef idx="1">
-            <a:schemeClr val="accent1"/>
-          </a:lnRef>
-          <a:fillRef idx="0">
-            <a:schemeClr val="accent1"/>
-          </a:fillRef>
-          <a:effectRef idx="0">
-            <a:schemeClr val="accent1"/>
-          </a:effectRef>
-          <a:fontRef idx="minor">
-            <a:schemeClr val="tx1"/>
-          </a:fontRef>
-        </p:style>
-      </p:cxnSp>
-      <p:cxnSp>
-        <p:nvCxnSpPr>
-          <p:cNvPr id="128" name="Straight Arrow Connector 127">
-            <a:extLst>
-              <a:ext uri="{FF2B5EF4-FFF2-40B4-BE49-F238E27FC236}">
-                <a16:creationId xmlns:a16="http://schemas.microsoft.com/office/drawing/2014/main" id="{8282A11D-2D76-4A93-805D-E54F289EFEA9}"/>
-              </a:ext>
-            </a:extLst>
-          </p:cNvPr>
-          <p:cNvCxnSpPr>
-            <a:cxnSpLocks/>
-          </p:cNvCxnSpPr>
-          <p:nvPr/>
-        </p:nvCxnSpPr>
-        <p:spPr>
-          <a:xfrm>
-            <a:off x="4667959" y="15270480"/>
-            <a:ext cx="1736822" cy="0"/>
-          </a:xfrm>
-          <a:prstGeom prst="straightConnector1">
-            <a:avLst/>
-          </a:prstGeom>
-          <a:ln w="76200">
-            <a:solidFill>
-              <a:schemeClr val="tx1"/>
-            </a:solidFill>
-            <a:tailEnd type="triangle"/>
-          </a:ln>
-        </p:spPr>
-        <p:style>
-          <a:lnRef idx="1">
-            <a:schemeClr val="accent1"/>
-          </a:lnRef>
-          <a:fillRef idx="0">
-            <a:schemeClr val="accent1"/>
-          </a:fillRef>
-          <a:effectRef idx="0">
-            <a:schemeClr val="accent1"/>
-          </a:effectRef>
-          <a:fontRef idx="minor">
-            <a:schemeClr val="tx1"/>
-          </a:fontRef>
-        </p:style>
-      </p:cxnSp>
       <p:grpSp>
         <p:nvGrpSpPr>
           <p:cNvPr id="141" name="Group 140">
@@ -5199,10 +5015,10 @@
         </p:nvGrpSpPr>
         <p:grpSpPr>
           <a:xfrm>
-            <a:off x="27197956" y="9991870"/>
-            <a:ext cx="4044574" cy="4934841"/>
-            <a:chOff x="26062134" y="14988903"/>
-            <a:chExt cx="4044574" cy="4934841"/>
+            <a:off x="27667106" y="10002223"/>
+            <a:ext cx="3437738" cy="4934841"/>
+            <a:chOff x="26062135" y="14988903"/>
+            <a:chExt cx="3397017" cy="4934841"/>
           </a:xfrm>
         </p:grpSpPr>
         <p:sp>
@@ -5219,8 +5035,8 @@
           </p:nvSpPr>
           <p:spPr>
             <a:xfrm>
-              <a:off x="26062134" y="14988903"/>
-              <a:ext cx="4044574" cy="4934841"/>
+              <a:off x="26062135" y="14988903"/>
+              <a:ext cx="3397017" cy="4934841"/>
             </a:xfrm>
             <a:prstGeom prst="rect">
               <a:avLst/>
@@ -5273,7 +5089,7 @@
           <p:spPr>
             <a:xfrm>
               <a:off x="26581177" y="16652048"/>
-              <a:ext cx="3006487" cy="1094180"/>
+              <a:ext cx="2396359" cy="1094180"/>
             </a:xfrm>
             <a:prstGeom prst="rect">
               <a:avLst/>
@@ -5334,8 +5150,8 @@
         </p:nvSpPr>
         <p:spPr>
           <a:xfrm>
-            <a:off x="27716999" y="13461464"/>
-            <a:ext cx="3006487" cy="1060380"/>
+            <a:off x="28186146" y="13471817"/>
+            <a:ext cx="2396359" cy="1060380"/>
           </a:xfrm>
           <a:prstGeom prst="rect">
             <a:avLst/>
@@ -5435,7 +5251,7 @@
         </p:nvGrpSpPr>
         <p:grpSpPr>
           <a:xfrm>
-            <a:off x="22494680" y="8647438"/>
+            <a:off x="23523873" y="8647438"/>
             <a:ext cx="3644184" cy="6289626"/>
             <a:chOff x="30106708" y="8768862"/>
             <a:chExt cx="3644184" cy="6289626"/>
@@ -5508,7 +5324,7 @@
           </p:nvSpPr>
           <p:spPr>
             <a:xfrm>
-              <a:off x="30495240" y="11776439"/>
+              <a:off x="30495240" y="11730719"/>
               <a:ext cx="3002279" cy="1094180"/>
             </a:xfrm>
             <a:prstGeom prst="rect">
@@ -5616,94 +5432,6 @@
             </a:p>
           </p:txBody>
         </p:sp>
-        <p:cxnSp>
-          <p:nvCxnSpPr>
-            <p:cNvPr id="144" name="Straight Arrow Connector 143">
-              <a:extLst>
-                <a:ext uri="{FF2B5EF4-FFF2-40B4-BE49-F238E27FC236}">
-                  <a16:creationId xmlns:a16="http://schemas.microsoft.com/office/drawing/2014/main" id="{606BB79B-7957-4A95-A1AB-EB81E67C1B09}"/>
-                </a:ext>
-              </a:extLst>
-            </p:cNvPr>
-            <p:cNvCxnSpPr>
-              <a:cxnSpLocks/>
-            </p:cNvCxnSpPr>
-            <p:nvPr/>
-          </p:nvCxnSpPr>
-          <p:spPr>
-            <a:xfrm>
-              <a:off x="32717474" y="10913961"/>
-              <a:ext cx="0" cy="852318"/>
-            </a:xfrm>
-            <a:prstGeom prst="straightConnector1">
-              <a:avLst/>
-            </a:prstGeom>
-            <a:ln w="76200">
-              <a:solidFill>
-                <a:schemeClr val="tx1"/>
-              </a:solidFill>
-              <a:tailEnd type="triangle"/>
-            </a:ln>
-          </p:spPr>
-          <p:style>
-            <a:lnRef idx="1">
-              <a:schemeClr val="accent1"/>
-            </a:lnRef>
-            <a:fillRef idx="0">
-              <a:schemeClr val="accent1"/>
-            </a:fillRef>
-            <a:effectRef idx="0">
-              <a:schemeClr val="accent1"/>
-            </a:effectRef>
-            <a:fontRef idx="minor">
-              <a:schemeClr val="tx1"/>
-            </a:fontRef>
-          </p:style>
-        </p:cxnSp>
-        <p:cxnSp>
-          <p:nvCxnSpPr>
-            <p:cNvPr id="145" name="Straight Arrow Connector 144">
-              <a:extLst>
-                <a:ext uri="{FF2B5EF4-FFF2-40B4-BE49-F238E27FC236}">
-                  <a16:creationId xmlns:a16="http://schemas.microsoft.com/office/drawing/2014/main" id="{FC87E194-BE8B-41EF-9EC8-EC6E75C187F7}"/>
-                </a:ext>
-              </a:extLst>
-            </p:cNvPr>
-            <p:cNvCxnSpPr>
-              <a:cxnSpLocks/>
-            </p:cNvCxnSpPr>
-            <p:nvPr/>
-          </p:nvCxnSpPr>
-          <p:spPr>
-            <a:xfrm flipV="1">
-              <a:off x="31165800" y="10913961"/>
-              <a:ext cx="0" cy="852318"/>
-            </a:xfrm>
-            <a:prstGeom prst="straightConnector1">
-              <a:avLst/>
-            </a:prstGeom>
-            <a:ln w="76200">
-              <a:solidFill>
-                <a:schemeClr val="tx1"/>
-              </a:solidFill>
-              <a:tailEnd type="triangle"/>
-            </a:ln>
-          </p:spPr>
-          <p:style>
-            <a:lnRef idx="1">
-              <a:schemeClr val="accent1"/>
-            </a:lnRef>
-            <a:fillRef idx="0">
-              <a:schemeClr val="accent1"/>
-            </a:fillRef>
-            <a:effectRef idx="0">
-              <a:schemeClr val="accent1"/>
-            </a:effectRef>
-            <a:fontRef idx="minor">
-              <a:schemeClr val="tx1"/>
-            </a:fontRef>
-          </p:style>
-        </p:cxnSp>
         <p:sp>
           <p:nvSpPr>
             <p:cNvPr id="158" name="Rectangle 157">
@@ -5805,94 +5533,6 @@
             </a:p>
           </p:txBody>
         </p:sp>
-        <p:cxnSp>
-          <p:nvCxnSpPr>
-            <p:cNvPr id="166" name="Straight Arrow Connector 165">
-              <a:extLst>
-                <a:ext uri="{FF2B5EF4-FFF2-40B4-BE49-F238E27FC236}">
-                  <a16:creationId xmlns:a16="http://schemas.microsoft.com/office/drawing/2014/main" id="{AB68B66A-B96F-4FFC-88BC-85EAD677FDE5}"/>
-                </a:ext>
-              </a:extLst>
-            </p:cNvPr>
-            <p:cNvCxnSpPr>
-              <a:cxnSpLocks/>
-            </p:cNvCxnSpPr>
-            <p:nvPr/>
-          </p:nvCxnSpPr>
-          <p:spPr>
-            <a:xfrm>
-              <a:off x="32717474" y="12840335"/>
-              <a:ext cx="0" cy="708752"/>
-            </a:xfrm>
-            <a:prstGeom prst="straightConnector1">
-              <a:avLst/>
-            </a:prstGeom>
-            <a:ln w="76200">
-              <a:solidFill>
-                <a:schemeClr val="tx1"/>
-              </a:solidFill>
-              <a:tailEnd type="triangle"/>
-            </a:ln>
-          </p:spPr>
-          <p:style>
-            <a:lnRef idx="1">
-              <a:schemeClr val="accent1"/>
-            </a:lnRef>
-            <a:fillRef idx="0">
-              <a:schemeClr val="accent1"/>
-            </a:fillRef>
-            <a:effectRef idx="0">
-              <a:schemeClr val="accent1"/>
-            </a:effectRef>
-            <a:fontRef idx="minor">
-              <a:schemeClr val="tx1"/>
-            </a:fontRef>
-          </p:style>
-        </p:cxnSp>
-        <p:cxnSp>
-          <p:nvCxnSpPr>
-            <p:cNvPr id="167" name="Straight Arrow Connector 166">
-              <a:extLst>
-                <a:ext uri="{FF2B5EF4-FFF2-40B4-BE49-F238E27FC236}">
-                  <a16:creationId xmlns:a16="http://schemas.microsoft.com/office/drawing/2014/main" id="{150CEA4B-11C4-4A5B-8505-9D1D9F0D58C5}"/>
-                </a:ext>
-              </a:extLst>
-            </p:cNvPr>
-            <p:cNvCxnSpPr>
-              <a:cxnSpLocks/>
-            </p:cNvCxnSpPr>
-            <p:nvPr/>
-          </p:nvCxnSpPr>
-          <p:spPr>
-            <a:xfrm flipV="1">
-              <a:off x="31165800" y="12840335"/>
-              <a:ext cx="0" cy="708752"/>
-            </a:xfrm>
-            <a:prstGeom prst="straightConnector1">
-              <a:avLst/>
-            </a:prstGeom>
-            <a:ln w="76200">
-              <a:solidFill>
-                <a:schemeClr val="tx1"/>
-              </a:solidFill>
-              <a:tailEnd type="triangle"/>
-            </a:ln>
-          </p:spPr>
-          <p:style>
-            <a:lnRef idx="1">
-              <a:schemeClr val="accent1"/>
-            </a:lnRef>
-            <a:fillRef idx="0">
-              <a:schemeClr val="accent1"/>
-            </a:fillRef>
-            <a:effectRef idx="0">
-              <a:schemeClr val="accent1"/>
-            </a:effectRef>
-            <a:fontRef idx="minor">
-              <a:schemeClr val="tx1"/>
-            </a:fontRef>
-          </p:style>
-        </p:cxnSp>
       </p:grpSp>
       <p:grpSp>
         <p:nvGrpSpPr>
@@ -5908,10 +5548,10 @@
         </p:nvGrpSpPr>
         <p:grpSpPr>
           <a:xfrm>
-            <a:off x="17277663" y="10438253"/>
-            <a:ext cx="3908503" cy="4498811"/>
-            <a:chOff x="24413147" y="10501534"/>
-            <a:chExt cx="3908503" cy="4498811"/>
+            <a:off x="17277662" y="10438253"/>
+            <a:ext cx="5699843" cy="4498811"/>
+            <a:chOff x="24413146" y="10501534"/>
+            <a:chExt cx="5699843" cy="4498811"/>
           </a:xfrm>
         </p:grpSpPr>
         <p:grpSp>
@@ -5928,10 +5568,10 @@
           </p:nvGrpSpPr>
           <p:grpSpPr>
             <a:xfrm>
-              <a:off x="24413147" y="10501534"/>
-              <a:ext cx="3908503" cy="4498811"/>
-              <a:chOff x="25647839" y="16230084"/>
-              <a:chExt cx="3908503" cy="4498811"/>
+              <a:off x="24413146" y="10501534"/>
+              <a:ext cx="5699843" cy="4498811"/>
+              <a:chOff x="25647838" y="16230084"/>
+              <a:chExt cx="5699843" cy="4498811"/>
             </a:xfrm>
           </p:grpSpPr>
           <p:sp>
@@ -5948,8 +5588,8 @@
             </p:nvSpPr>
             <p:spPr>
               <a:xfrm>
-                <a:off x="25647839" y="16230084"/>
-                <a:ext cx="3908503" cy="4498811"/>
+                <a:off x="25647838" y="16230084"/>
+                <a:ext cx="5699843" cy="4498811"/>
               </a:xfrm>
               <a:prstGeom prst="rect">
                 <a:avLst/>
@@ -6001,8 +5641,8 @@
             </p:nvSpPr>
             <p:spPr>
               <a:xfrm>
-                <a:off x="26098846" y="17266920"/>
-                <a:ext cx="3006487" cy="1172175"/>
+                <a:off x="26110422" y="17266920"/>
+                <a:ext cx="4841175" cy="1172175"/>
               </a:xfrm>
               <a:prstGeom prst="rect">
                 <a:avLst/>
@@ -6064,7 +5704,7 @@
           <p:spPr>
             <a:xfrm>
               <a:off x="24886526" y="13429457"/>
-              <a:ext cx="3006487" cy="1182944"/>
+              <a:ext cx="2264939" cy="1182944"/>
             </a:xfrm>
             <a:prstGeom prst="rect">
               <a:avLst/>
@@ -6100,7 +5740,7 @@
             <a:p>
               <a:pPr algn="ctr"/>
               <a:r>
-                <a:rPr lang="en-GB" sz="2500" dirty="0" err="1">
+                <a:rPr lang="en-GB" sz="2500" dirty="0">
                   <a:ln w="0"/>
                   <a:solidFill>
                     <a:schemeClr val="tx1"/>
@@ -6113,21 +5753,8 @@
                     </a:outerShdw>
                   </a:effectLst>
                 </a:rPr>
-                <a:t>Wifi</a:t>
+                <a:t>Bluetooth</a:t>
               </a:r>
-              <a:endParaRPr lang="en-GB" sz="2500" dirty="0">
-                <a:ln w="0"/>
-                <a:solidFill>
-                  <a:schemeClr val="tx1"/>
-                </a:solidFill>
-                <a:effectLst>
-                  <a:outerShdw blurRad="38100" dist="19050" dir="2700000" algn="tl" rotWithShape="0">
-                    <a:schemeClr val="dk1">
-                      <a:alpha val="40000"/>
-                    </a:schemeClr>
-                  </a:outerShdw>
-                </a:effectLst>
-              </a:endParaRPr>
             </a:p>
             <a:p>
               <a:pPr algn="ctr"/>
@@ -6153,32 +5780,33 @@
       </p:grpSp>
       <p:cxnSp>
         <p:nvCxnSpPr>
-          <p:cNvPr id="175" name="Connector: Elbow 174">
+          <p:cNvPr id="3" name="Straight Arrow Connector 2">
             <a:extLst>
               <a:ext uri="{FF2B5EF4-FFF2-40B4-BE49-F238E27FC236}">
-                <a16:creationId xmlns:a16="http://schemas.microsoft.com/office/drawing/2014/main" id="{A11F55C9-7E86-4985-9C3D-4E571C514BFA}"/>
+                <a16:creationId xmlns:a16="http://schemas.microsoft.com/office/drawing/2014/main" id="{32E8FCC8-96F9-4417-B847-43F5722ABC3C}"/>
               </a:ext>
             </a:extLst>
           </p:cNvPr>
           <p:cNvCxnSpPr>
             <a:cxnSpLocks/>
+            <a:stCxn id="86" idx="3"/>
+            <a:endCxn id="58" idx="1"/>
           </p:cNvCxnSpPr>
           <p:nvPr/>
         </p:nvCxnSpPr>
         <p:spPr>
-          <a:xfrm flipV="1">
-            <a:off x="15543391" y="14572778"/>
-            <a:ext cx="4481969" cy="1040553"/>
+          <a:xfrm>
+            <a:off x="4661289" y="15611252"/>
+            <a:ext cx="1743492" cy="4887"/>
           </a:xfrm>
-          <a:prstGeom prst="bentConnector3">
-            <a:avLst>
-              <a:gd name="adj1" fmla="val 100101"/>
-            </a:avLst>
+          <a:prstGeom prst="straightConnector1">
+            <a:avLst/>
           </a:prstGeom>
           <a:ln w="76200">
             <a:solidFill>
               <a:schemeClr val="tx1"/>
             </a:solidFill>
+            <a:headEnd type="triangle"/>
             <a:tailEnd type="triangle"/>
           </a:ln>
         </p:spPr>
@@ -6199,32 +5827,33 @@
       </p:cxnSp>
       <p:cxnSp>
         <p:nvCxnSpPr>
-          <p:cNvPr id="179" name="Connector: Elbow 178">
+          <p:cNvPr id="65" name="Straight Arrow Connector 64">
             <a:extLst>
               <a:ext uri="{FF2B5EF4-FFF2-40B4-BE49-F238E27FC236}">
-                <a16:creationId xmlns:a16="http://schemas.microsoft.com/office/drawing/2014/main" id="{CD313B8A-29CD-4E47-82D5-D0BD05DDBB30}"/>
+                <a16:creationId xmlns:a16="http://schemas.microsoft.com/office/drawing/2014/main" id="{B6ACC0D2-332B-46F9-9495-AA21A4D9A7DE}"/>
               </a:ext>
             </a:extLst>
           </p:cNvPr>
           <p:cNvCxnSpPr>
             <a:cxnSpLocks/>
+            <a:stCxn id="58" idx="3"/>
+            <a:endCxn id="99" idx="1"/>
           </p:cNvCxnSpPr>
           <p:nvPr/>
         </p:nvCxnSpPr>
         <p:spPr>
           <a:xfrm flipV="1">
-            <a:off x="19254286" y="14547985"/>
-            <a:ext cx="4299486" cy="1065346"/>
+            <a:off x="11855644" y="15608505"/>
+            <a:ext cx="1795448" cy="7634"/>
           </a:xfrm>
-          <a:prstGeom prst="bentConnector3">
-            <a:avLst>
-              <a:gd name="adj1" fmla="val 99270"/>
-            </a:avLst>
+          <a:prstGeom prst="straightConnector1">
+            <a:avLst/>
           </a:prstGeom>
           <a:ln w="76200">
             <a:solidFill>
               <a:schemeClr val="tx1"/>
             </a:solidFill>
+            <a:headEnd type="triangle"/>
             <a:tailEnd type="triangle"/>
           </a:ln>
         </p:spPr>
@@ -6245,32 +5874,32 @@
       </p:cxnSp>
       <p:cxnSp>
         <p:nvCxnSpPr>
-          <p:cNvPr id="192" name="Connector: Elbow 191">
+          <p:cNvPr id="70" name="Straight Arrow Connector 69">
             <a:extLst>
               <a:ext uri="{FF2B5EF4-FFF2-40B4-BE49-F238E27FC236}">
-                <a16:creationId xmlns:a16="http://schemas.microsoft.com/office/drawing/2014/main" id="{60E7F688-754E-4428-8F63-20A54498A06E}"/>
+                <a16:creationId xmlns:a16="http://schemas.microsoft.com/office/drawing/2014/main" id="{16671A86-8BF8-4B08-900A-ED042536E5BF}"/>
               </a:ext>
             </a:extLst>
           </p:cNvPr>
           <p:cNvCxnSpPr>
             <a:cxnSpLocks/>
+            <a:stCxn id="160" idx="0"/>
           </p:cNvCxnSpPr>
           <p:nvPr/>
         </p:nvCxnSpPr>
         <p:spPr>
-          <a:xfrm rot="10800000" flipV="1">
-            <a:off x="15543393" y="14572777"/>
-            <a:ext cx="9562055" cy="1414220"/>
+          <a:xfrm flipV="1">
+            <a:off x="18883512" y="12647262"/>
+            <a:ext cx="0" cy="718914"/>
           </a:xfrm>
-          <a:prstGeom prst="bentConnector3">
-            <a:avLst>
-              <a:gd name="adj1" fmla="val 273"/>
-            </a:avLst>
+          <a:prstGeom prst="straightConnector1">
+            <a:avLst/>
           </a:prstGeom>
           <a:ln w="76200">
             <a:solidFill>
               <a:schemeClr val="tx1"/>
             </a:solidFill>
+            <a:headEnd type="triangle"/>
             <a:tailEnd type="triangle"/>
           </a:ln>
         </p:spPr>
@@ -6291,32 +5920,33 @@
       </p:cxnSp>
       <p:cxnSp>
         <p:nvCxnSpPr>
-          <p:cNvPr id="196" name="Connector: Elbow 195">
+          <p:cNvPr id="72" name="Straight Arrow Connector 71">
             <a:extLst>
               <a:ext uri="{FF2B5EF4-FFF2-40B4-BE49-F238E27FC236}">
-                <a16:creationId xmlns:a16="http://schemas.microsoft.com/office/drawing/2014/main" id="{9F359867-084C-4B4D-A64C-E8009DDF8240}"/>
+                <a16:creationId xmlns:a16="http://schemas.microsoft.com/office/drawing/2014/main" id="{6B680904-1536-45FB-9CA7-89097B9624AD}"/>
               </a:ext>
             </a:extLst>
           </p:cNvPr>
           <p:cNvCxnSpPr>
             <a:cxnSpLocks/>
+            <a:stCxn id="158" idx="0"/>
+            <a:endCxn id="14" idx="2"/>
           </p:cNvCxnSpPr>
           <p:nvPr/>
         </p:nvCxnSpPr>
         <p:spPr>
           <a:xfrm flipV="1">
-            <a:off x="25105446" y="14521843"/>
-            <a:ext cx="3268871" cy="1465157"/>
+            <a:off x="25413545" y="12703475"/>
+            <a:ext cx="0" cy="724188"/>
           </a:xfrm>
-          <a:prstGeom prst="bentConnector3">
-            <a:avLst>
-              <a:gd name="adj1" fmla="val 99885"/>
-            </a:avLst>
+          <a:prstGeom prst="straightConnector1">
+            <a:avLst/>
           </a:prstGeom>
           <a:ln w="76200">
             <a:solidFill>
               <a:schemeClr val="tx1"/>
             </a:solidFill>
+            <a:headEnd type="triangle"/>
             <a:tailEnd type="triangle"/>
           </a:ln>
         </p:spPr>
@@ -6337,22 +5967,24 @@
       </p:cxnSp>
       <p:cxnSp>
         <p:nvCxnSpPr>
-          <p:cNvPr id="202" name="Straight Arrow Connector 201">
+          <p:cNvPr id="73" name="Straight Arrow Connector 72">
             <a:extLst>
               <a:ext uri="{FF2B5EF4-FFF2-40B4-BE49-F238E27FC236}">
-                <a16:creationId xmlns:a16="http://schemas.microsoft.com/office/drawing/2014/main" id="{95E40ACF-4AFA-4BF1-BC28-4C58BB7B23DC}"/>
+                <a16:creationId xmlns:a16="http://schemas.microsoft.com/office/drawing/2014/main" id="{06E06E01-3830-4EEF-A6A5-B7E759C0ED57}"/>
               </a:ext>
             </a:extLst>
           </p:cNvPr>
           <p:cNvCxnSpPr>
             <a:cxnSpLocks/>
+            <a:stCxn id="162" idx="0"/>
+            <a:endCxn id="140" idx="2"/>
           </p:cNvCxnSpPr>
           <p:nvPr/>
         </p:nvCxnSpPr>
         <p:spPr>
-          <a:xfrm>
-            <a:off x="29936526" y="12718911"/>
-            <a:ext cx="0" cy="708752"/>
+          <a:xfrm flipV="1">
+            <a:off x="29384326" y="12759548"/>
+            <a:ext cx="20584" cy="712269"/>
           </a:xfrm>
           <a:prstGeom prst="straightConnector1">
             <a:avLst/>
@@ -6361,6 +5993,7 @@
             <a:solidFill>
               <a:schemeClr val="tx1"/>
             </a:solidFill>
+            <a:headEnd type="triangle"/>
             <a:tailEnd type="triangle"/>
           </a:ln>
         </p:spPr>
@@ -6381,22 +6014,24 @@
       </p:cxnSp>
       <p:cxnSp>
         <p:nvCxnSpPr>
-          <p:cNvPr id="203" name="Straight Arrow Connector 202">
+          <p:cNvPr id="74" name="Straight Arrow Connector 73">
             <a:extLst>
               <a:ext uri="{FF2B5EF4-FFF2-40B4-BE49-F238E27FC236}">
-                <a16:creationId xmlns:a16="http://schemas.microsoft.com/office/drawing/2014/main" id="{8685B8A8-CD36-437F-9B00-E47A54D1F5EF}"/>
+                <a16:creationId xmlns:a16="http://schemas.microsoft.com/office/drawing/2014/main" id="{58D80368-FDD0-4C6D-BE03-5BA31623E4BD}"/>
               </a:ext>
             </a:extLst>
           </p:cNvPr>
           <p:cNvCxnSpPr>
             <a:cxnSpLocks/>
+            <a:stCxn id="14" idx="0"/>
+            <a:endCxn id="143" idx="2"/>
           </p:cNvCxnSpPr>
           <p:nvPr/>
         </p:nvCxnSpPr>
         <p:spPr>
           <a:xfrm flipV="1">
-            <a:off x="28384852" y="12718911"/>
-            <a:ext cx="0" cy="708752"/>
+            <a:off x="25413545" y="10803827"/>
+            <a:ext cx="0" cy="805468"/>
           </a:xfrm>
           <a:prstGeom prst="straightConnector1">
             <a:avLst/>
@@ -6405,6 +6040,7 @@
             <a:solidFill>
               <a:schemeClr val="tx1"/>
             </a:solidFill>
+            <a:headEnd type="triangle"/>
             <a:tailEnd type="triangle"/>
           </a:ln>
         </p:spPr>
@@ -6425,10 +6061,158 @@
       </p:cxnSp>
       <p:cxnSp>
         <p:nvCxnSpPr>
-          <p:cNvPr id="209" name="Connector: Elbow 208">
+          <p:cNvPr id="31" name="Connector: Elbow 30">
             <a:extLst>
               <a:ext uri="{FF2B5EF4-FFF2-40B4-BE49-F238E27FC236}">
-                <a16:creationId xmlns:a16="http://schemas.microsoft.com/office/drawing/2014/main" id="{ADF58809-EA33-43B5-A81E-9C5D826EBB76}"/>
+                <a16:creationId xmlns:a16="http://schemas.microsoft.com/office/drawing/2014/main" id="{5D9096A5-40CB-45E2-8401-1829D6E04C59}"/>
+              </a:ext>
+            </a:extLst>
+          </p:cNvPr>
+          <p:cNvCxnSpPr>
+            <a:cxnSpLocks/>
+            <a:stCxn id="99" idx="3"/>
+            <a:endCxn id="160" idx="2"/>
+          </p:cNvCxnSpPr>
+          <p:nvPr/>
+        </p:nvCxnSpPr>
+        <p:spPr>
+          <a:xfrm flipV="1">
+            <a:off x="15543392" y="14549120"/>
+            <a:ext cx="3340120" cy="1059385"/>
+          </a:xfrm>
+          <a:prstGeom prst="bentConnector2">
+            <a:avLst/>
+          </a:prstGeom>
+          <a:ln w="76200">
+            <a:solidFill>
+              <a:schemeClr val="tx1"/>
+            </a:solidFill>
+            <a:headEnd type="triangle"/>
+            <a:tailEnd type="triangle"/>
+          </a:ln>
+        </p:spPr>
+        <p:style>
+          <a:lnRef idx="1">
+            <a:schemeClr val="accent1"/>
+          </a:lnRef>
+          <a:fillRef idx="0">
+            <a:schemeClr val="accent1"/>
+          </a:fillRef>
+          <a:effectRef idx="0">
+            <a:schemeClr val="accent1"/>
+          </a:effectRef>
+          <a:fontRef idx="minor">
+            <a:schemeClr val="tx1"/>
+          </a:fontRef>
+        </p:style>
+      </p:cxnSp>
+      <p:sp>
+        <p:nvSpPr>
+          <p:cNvPr id="34" name="Rectangle 33">
+            <a:extLst>
+              <a:ext uri="{FF2B5EF4-FFF2-40B4-BE49-F238E27FC236}">
+                <a16:creationId xmlns:a16="http://schemas.microsoft.com/office/drawing/2014/main" id="{C7A779D3-227E-4569-8DE3-50F36BEEBA27}"/>
+              </a:ext>
+            </a:extLst>
+          </p:cNvPr>
+          <p:cNvSpPr/>
+          <p:nvPr/>
+        </p:nvSpPr>
+        <p:spPr>
+          <a:xfrm>
+            <a:off x="20316486" y="13368499"/>
+            <a:ext cx="2264940" cy="1182944"/>
+          </a:xfrm>
+          <a:prstGeom prst="rect">
+            <a:avLst/>
+          </a:prstGeom>
+          <a:solidFill>
+            <a:srgbClr val="00B0F0"/>
+          </a:solidFill>
+          <a:ln>
+            <a:solidFill>
+              <a:srgbClr val="00B0F0"/>
+            </a:solidFill>
+          </a:ln>
+        </p:spPr>
+        <p:style>
+          <a:lnRef idx="2">
+            <a:schemeClr val="accent4">
+              <a:shade val="50000"/>
+            </a:schemeClr>
+          </a:lnRef>
+          <a:fillRef idx="1">
+            <a:schemeClr val="accent4"/>
+          </a:fillRef>
+          <a:effectRef idx="0">
+            <a:schemeClr val="accent4"/>
+          </a:effectRef>
+          <a:fontRef idx="minor">
+            <a:schemeClr val="lt1"/>
+          </a:fontRef>
+        </p:style>
+        <p:txBody>
+          <a:bodyPr rtlCol="0" anchor="ctr"/>
+          <a:lstStyle/>
+          <a:p>
+            <a:pPr algn="ctr"/>
+            <a:r>
+              <a:rPr lang="en-GB" sz="2500" dirty="0" err="1">
+                <a:ln w="0"/>
+                <a:solidFill>
+                  <a:schemeClr val="tx1"/>
+                </a:solidFill>
+                <a:effectLst>
+                  <a:outerShdw blurRad="38100" dist="19050" dir="2700000" algn="tl" rotWithShape="0">
+                    <a:schemeClr val="dk1">
+                      <a:alpha val="40000"/>
+                    </a:schemeClr>
+                  </a:outerShdw>
+                </a:effectLst>
+              </a:rPr>
+              <a:t>Wifi</a:t>
+            </a:r>
+            <a:endParaRPr lang="en-GB" sz="2500" dirty="0">
+              <a:ln w="0"/>
+              <a:solidFill>
+                <a:schemeClr val="tx1"/>
+              </a:solidFill>
+              <a:effectLst>
+                <a:outerShdw blurRad="38100" dist="19050" dir="2700000" algn="tl" rotWithShape="0">
+                  <a:schemeClr val="dk1">
+                    <a:alpha val="40000"/>
+                  </a:schemeClr>
+                </a:outerShdw>
+              </a:effectLst>
+            </a:endParaRPr>
+          </a:p>
+          <a:p>
+            <a:pPr algn="ctr"/>
+            <a:r>
+              <a:rPr lang="en-GB" sz="2500" dirty="0">
+                <a:ln w="0"/>
+                <a:solidFill>
+                  <a:schemeClr val="tx1"/>
+                </a:solidFill>
+                <a:effectLst>
+                  <a:outerShdw blurRad="38100" dist="19050" dir="2700000" algn="tl" rotWithShape="0">
+                    <a:schemeClr val="dk1">
+                      <a:alpha val="40000"/>
+                    </a:schemeClr>
+                  </a:outerShdw>
+                </a:effectLst>
+              </a:rPr>
+              <a:t>Module</a:t>
+            </a:r>
+          </a:p>
+        </p:txBody>
+      </p:sp>
+      <p:cxnSp>
+        <p:nvCxnSpPr>
+          <p:cNvPr id="120" name="Straight Arrow Connector 119">
+            <a:extLst>
+              <a:ext uri="{FF2B5EF4-FFF2-40B4-BE49-F238E27FC236}">
+                <a16:creationId xmlns:a16="http://schemas.microsoft.com/office/drawing/2014/main" id="{54E1EFC5-3B55-4E54-978F-22880A82EC91}"/>
               </a:ext>
             </a:extLst>
           </p:cNvPr>
@@ -6438,19 +6222,18 @@
           <p:nvPr/>
         </p:nvCxnSpPr>
         <p:spPr>
-          <a:xfrm rot="10800000" flipV="1">
-            <a:off x="15543392" y="14600054"/>
-            <a:ext cx="2775088" cy="667978"/>
+          <a:xfrm flipV="1">
+            <a:off x="21386149" y="12618368"/>
+            <a:ext cx="0" cy="718914"/>
           </a:xfrm>
-          <a:prstGeom prst="bentConnector3">
-            <a:avLst>
-              <a:gd name="adj1" fmla="val 25"/>
-            </a:avLst>
+          <a:prstGeom prst="straightConnector1">
+            <a:avLst/>
           </a:prstGeom>
           <a:ln w="76200">
             <a:solidFill>
               <a:schemeClr val="tx1"/>
             </a:solidFill>
+            <a:headEnd type="triangle"/>
             <a:tailEnd type="triangle"/>
           </a:ln>
         </p:spPr>
@@ -6471,32 +6254,35 @@
       </p:cxnSp>
       <p:cxnSp>
         <p:nvCxnSpPr>
-          <p:cNvPr id="217" name="Connector: Elbow 216">
+          <p:cNvPr id="122" name="Connector: Elbow 121">
             <a:extLst>
               <a:ext uri="{FF2B5EF4-FFF2-40B4-BE49-F238E27FC236}">
-                <a16:creationId xmlns:a16="http://schemas.microsoft.com/office/drawing/2014/main" id="{409F944C-10DD-440A-9B41-B7216A3EA78A}"/>
+                <a16:creationId xmlns:a16="http://schemas.microsoft.com/office/drawing/2014/main" id="{CD00579E-BFCF-4D27-816A-36F0E789F45A}"/>
               </a:ext>
             </a:extLst>
           </p:cNvPr>
           <p:cNvCxnSpPr>
             <a:cxnSpLocks/>
+            <a:stCxn id="34" idx="2"/>
+            <a:endCxn id="80" idx="2"/>
           </p:cNvCxnSpPr>
           <p:nvPr/>
         </p:nvCxnSpPr>
         <p:spPr>
-          <a:xfrm rot="10800000" flipV="1">
-            <a:off x="15543394" y="14537824"/>
-            <a:ext cx="14393133" cy="1778095"/>
+          <a:xfrm rot="5400000" flipH="1" flipV="1">
+            <a:off x="22892204" y="13033169"/>
+            <a:ext cx="75025" cy="2961523"/>
           </a:xfrm>
           <a:prstGeom prst="bentConnector3">
             <a:avLst>
-              <a:gd name="adj1" fmla="val 23"/>
+              <a:gd name="adj1" fmla="val -1584432"/>
             </a:avLst>
           </a:prstGeom>
           <a:ln w="76200">
             <a:solidFill>
               <a:schemeClr val="tx1"/>
             </a:solidFill>
+            <a:headEnd type="triangle"/>
             <a:tailEnd type="triangle"/>
           </a:ln>
         </p:spPr>
@@ -6517,30 +6303,35 @@
       </p:cxnSp>
       <p:cxnSp>
         <p:nvCxnSpPr>
-          <p:cNvPr id="233" name="Straight Arrow Connector 232">
+          <p:cNvPr id="131" name="Connector: Elbow 130">
             <a:extLst>
               <a:ext uri="{FF2B5EF4-FFF2-40B4-BE49-F238E27FC236}">
-                <a16:creationId xmlns:a16="http://schemas.microsoft.com/office/drawing/2014/main" id="{CF7A2975-2EE5-4C2A-84FF-7D747B3B6CD8}"/>
+                <a16:creationId xmlns:a16="http://schemas.microsoft.com/office/drawing/2014/main" id="{37140C7C-682D-4637-8388-940495D735B1}"/>
               </a:ext>
             </a:extLst>
           </p:cNvPr>
           <p:cNvCxnSpPr>
             <a:cxnSpLocks/>
+            <a:stCxn id="75" idx="2"/>
+            <a:endCxn id="162" idx="2"/>
           </p:cNvCxnSpPr>
           <p:nvPr/>
         </p:nvCxnSpPr>
         <p:spPr>
-          <a:xfrm>
-            <a:off x="18318480" y="12613095"/>
-            <a:ext cx="0" cy="708752"/>
+          <a:xfrm rot="16200000" flipH="1">
+            <a:off x="27879742" y="13027612"/>
+            <a:ext cx="55779" cy="2953389"/>
           </a:xfrm>
-          <a:prstGeom prst="straightConnector1">
-            <a:avLst/>
+          <a:prstGeom prst="bentConnector3">
+            <a:avLst>
+              <a:gd name="adj1" fmla="val 2258447"/>
+            </a:avLst>
           </a:prstGeom>
           <a:ln w="76200">
             <a:solidFill>
               <a:schemeClr val="tx1"/>
             </a:solidFill>
+            <a:headEnd type="triangle"/>
             <a:tailEnd type="triangle"/>
           </a:ln>
         </p:spPr>
@@ -6559,50 +6350,138 @@
           </a:fontRef>
         </p:style>
       </p:cxnSp>
-      <p:cxnSp>
-        <p:nvCxnSpPr>
-          <p:cNvPr id="234" name="Straight Arrow Connector 233">
+      <p:sp>
+        <p:nvSpPr>
+          <p:cNvPr id="75" name="Rectangle 74">
             <a:extLst>
               <a:ext uri="{FF2B5EF4-FFF2-40B4-BE49-F238E27FC236}">
-                <a16:creationId xmlns:a16="http://schemas.microsoft.com/office/drawing/2014/main" id="{27A3E848-4541-4860-8A75-0A2CF95367B6}"/>
+                <a16:creationId xmlns:a16="http://schemas.microsoft.com/office/drawing/2014/main" id="{9EA3CFF4-6A0B-4E05-9B1C-086EC0BC4507}"/>
               </a:ext>
             </a:extLst>
           </p:cNvPr>
-          <p:cNvCxnSpPr>
-            <a:cxnSpLocks/>
-          </p:cNvCxnSpPr>
+          <p:cNvSpPr/>
           <p:nvPr/>
-        </p:nvCxnSpPr>
+        </p:nvSpPr>
         <p:spPr>
-          <a:xfrm flipV="1">
-            <a:off x="20025360" y="12613095"/>
-            <a:ext cx="0" cy="708752"/>
+          <a:xfrm>
+            <a:off x="25967171" y="13461463"/>
+            <a:ext cx="927531" cy="1014955"/>
           </a:xfrm>
-          <a:prstGeom prst="straightConnector1">
+          <a:prstGeom prst="rect">
             <a:avLst/>
           </a:prstGeom>
-          <a:ln w="76200">
+          <a:solidFill>
+            <a:srgbClr val="00B0F0"/>
+          </a:solidFill>
+          <a:ln>
             <a:solidFill>
-              <a:schemeClr val="tx1"/>
+              <a:srgbClr val="00B0F0"/>
             </a:solidFill>
-            <a:tailEnd type="triangle"/>
           </a:ln>
         </p:spPr>
         <p:style>
-          <a:lnRef idx="1">
-            <a:schemeClr val="accent1"/>
+          <a:lnRef idx="2">
+            <a:schemeClr val="accent4">
+              <a:shade val="50000"/>
+            </a:schemeClr>
           </a:lnRef>
-          <a:fillRef idx="0">
-            <a:schemeClr val="accent1"/>
+          <a:fillRef idx="1">
+            <a:schemeClr val="accent4"/>
           </a:fillRef>
           <a:effectRef idx="0">
-            <a:schemeClr val="accent1"/>
+            <a:schemeClr val="accent4"/>
           </a:effectRef>
           <a:fontRef idx="minor">
-            <a:schemeClr val="tx1"/>
+            <a:schemeClr val="lt1"/>
           </a:fontRef>
         </p:style>
-      </p:cxnSp>
+        <p:txBody>
+          <a:bodyPr rtlCol="0" anchor="ctr"/>
+          <a:lstStyle/>
+          <a:p>
+            <a:pPr algn="ctr"/>
+            <a:endParaRPr lang="en-GB" sz="2500" dirty="0">
+              <a:ln w="0"/>
+              <a:solidFill>
+                <a:schemeClr val="tx1"/>
+              </a:solidFill>
+              <a:effectLst>
+                <a:outerShdw blurRad="38100" dist="19050" dir="2700000" algn="tl" rotWithShape="0">
+                  <a:schemeClr val="dk1">
+                    <a:alpha val="40000"/>
+                  </a:schemeClr>
+                </a:outerShdw>
+              </a:effectLst>
+            </a:endParaRPr>
+          </a:p>
+        </p:txBody>
+      </p:sp>
+      <p:sp>
+        <p:nvSpPr>
+          <p:cNvPr id="80" name="Rectangle 79">
+            <a:extLst>
+              <a:ext uri="{FF2B5EF4-FFF2-40B4-BE49-F238E27FC236}">
+                <a16:creationId xmlns:a16="http://schemas.microsoft.com/office/drawing/2014/main" id="{698B8AE3-CDFD-4792-A888-99A8FFE0CED4}"/>
+              </a:ext>
+            </a:extLst>
+          </p:cNvPr>
+          <p:cNvSpPr/>
+          <p:nvPr/>
+        </p:nvSpPr>
+        <p:spPr>
+          <a:xfrm>
+            <a:off x="23946713" y="13461463"/>
+            <a:ext cx="927531" cy="1014955"/>
+          </a:xfrm>
+          <a:prstGeom prst="rect">
+            <a:avLst/>
+          </a:prstGeom>
+          <a:solidFill>
+            <a:srgbClr val="00B0F0"/>
+          </a:solidFill>
+          <a:ln>
+            <a:solidFill>
+              <a:srgbClr val="00B0F0"/>
+            </a:solidFill>
+          </a:ln>
+        </p:spPr>
+        <p:style>
+          <a:lnRef idx="2">
+            <a:schemeClr val="accent4">
+              <a:shade val="50000"/>
+            </a:schemeClr>
+          </a:lnRef>
+          <a:fillRef idx="1">
+            <a:schemeClr val="accent4"/>
+          </a:fillRef>
+          <a:effectRef idx="0">
+            <a:schemeClr val="accent4"/>
+          </a:effectRef>
+          <a:fontRef idx="minor">
+            <a:schemeClr val="lt1"/>
+          </a:fontRef>
+        </p:style>
+        <p:txBody>
+          <a:bodyPr rtlCol="0" anchor="ctr"/>
+          <a:lstStyle/>
+          <a:p>
+            <a:pPr algn="ctr"/>
+            <a:endParaRPr lang="en-GB" sz="2500" dirty="0">
+              <a:ln w="0"/>
+              <a:solidFill>
+                <a:schemeClr val="tx1"/>
+              </a:solidFill>
+              <a:effectLst>
+                <a:outerShdw blurRad="38100" dist="19050" dir="2700000" algn="tl" rotWithShape="0">
+                  <a:schemeClr val="dk1">
+                    <a:alpha val="40000"/>
+                  </a:schemeClr>
+                </a:outerShdw>
+              </a:effectLst>
+            </a:endParaRPr>
+          </a:p>
+        </p:txBody>
+      </p:sp>
     </p:spTree>
     <p:extLst>
       <p:ext uri="{BB962C8B-B14F-4D97-AF65-F5344CB8AC3E}">

</xml_diff>